<commit_message>
slide on transaction handling
</commit_message>
<xml_diff>
--- a/doc/intro/slides/lesson_06_ejb.pptx
+++ b/doc/intro/slides/lesson_06_ejb.pptx
@@ -5,7 +5,7 @@
     <p:sldMasterId id="2147483648" r:id="rId1"/>
   </p:sldMasterIdLst>
   <p:notesMasterIdLst>
-    <p:notesMasterId r:id="rId9"/>
+    <p:notesMasterId r:id="rId10"/>
   </p:notesMasterIdLst>
   <p:sldIdLst>
     <p:sldId id="256" r:id="rId2"/>
@@ -14,7 +14,8 @@
     <p:sldId id="277" r:id="rId5"/>
     <p:sldId id="278" r:id="rId6"/>
     <p:sldId id="279" r:id="rId7"/>
-    <p:sldId id="271" r:id="rId8"/>
+    <p:sldId id="280" r:id="rId8"/>
+    <p:sldId id="271" r:id="rId9"/>
   </p:sldIdLst>
   <p:sldSz cx="12192000" cy="6858000"/>
   <p:notesSz cx="6858000" cy="9144000"/>
@@ -203,7 +204,7 @@
           <a:p>
             <a:fld id="{9B5B52BA-3295-0343-9E28-A260A811DD10}" type="datetimeFigureOut">
               <a:rPr lang="en-US" smtClean="0"/>
-              <a:t>12/26/18</a:t>
+              <a:t>1/1/2021</a:t>
             </a:fld>
             <a:endParaRPr lang="en-US"/>
           </a:p>
@@ -267,38 +268,37 @@
           <a:p>
             <a:pPr lvl="0"/>
             <a:r>
-              <a:rPr lang="en-US" smtClean="0"/>
+              <a:rPr lang="en-US"/>
               <a:t>Click to edit Master text styles</a:t>
             </a:r>
           </a:p>
           <a:p>
             <a:pPr lvl="1"/>
             <a:r>
-              <a:rPr lang="en-US" smtClean="0"/>
+              <a:rPr lang="en-US"/>
               <a:t>Second level</a:t>
             </a:r>
           </a:p>
           <a:p>
             <a:pPr lvl="2"/>
             <a:r>
-              <a:rPr lang="en-US" smtClean="0"/>
+              <a:rPr lang="en-US"/>
               <a:t>Third level</a:t>
             </a:r>
           </a:p>
           <a:p>
             <a:pPr lvl="3"/>
             <a:r>
-              <a:rPr lang="en-US" smtClean="0"/>
+              <a:rPr lang="en-US"/>
               <a:t>Fourth level</a:t>
             </a:r>
           </a:p>
           <a:p>
             <a:pPr lvl="4"/>
             <a:r>
-              <a:rPr lang="en-US" smtClean="0"/>
+              <a:rPr lang="en-US"/>
               <a:t>Fifth level</a:t>
             </a:r>
-            <a:endParaRPr lang="en-US"/>
           </a:p>
         </p:txBody>
       </p:sp>
@@ -513,10 +513,9 @@
           </a:lstStyle>
           <a:p>
             <a:r>
-              <a:rPr lang="en-US" dirty="0" smtClean="0"/>
+              <a:rPr lang="en-US" dirty="0"/>
               <a:t>Click to edit Master title style</a:t>
             </a:r>
-            <a:endParaRPr lang="en-US" dirty="0"/>
           </a:p>
         </p:txBody>
       </p:sp>
@@ -578,10 +577,9 @@
           </a:lstStyle>
           <a:p>
             <a:r>
-              <a:rPr lang="en-US" dirty="0" smtClean="0"/>
+              <a:rPr lang="en-US" dirty="0"/>
               <a:t>Click to edit Master subtitle style</a:t>
             </a:r>
-            <a:endParaRPr lang="en-US" dirty="0"/>
           </a:p>
         </p:txBody>
       </p:sp>
@@ -602,7 +600,7 @@
           <a:p>
             <a:fld id="{04F1D4A2-813C-F741-B481-C92B3A596030}" type="datetimeFigureOut">
               <a:rPr lang="en-US" smtClean="0"/>
-              <a:t>12/26/18</a:t>
+              <a:t>1/1/2021</a:t>
             </a:fld>
             <a:endParaRPr lang="en-US"/>
           </a:p>
@@ -696,10 +694,9 @@
           <a:lstStyle/>
           <a:p>
             <a:r>
-              <a:rPr lang="en-US" smtClean="0"/>
+              <a:rPr lang="en-US"/>
               <a:t>Click to edit Master title style</a:t>
             </a:r>
-            <a:endParaRPr lang="en-US"/>
           </a:p>
         </p:txBody>
       </p:sp>
@@ -720,38 +717,37 @@
           <a:p>
             <a:pPr lvl="0"/>
             <a:r>
-              <a:rPr lang="en-US" smtClean="0"/>
+              <a:rPr lang="en-US"/>
               <a:t>Click to edit Master text styles</a:t>
             </a:r>
           </a:p>
           <a:p>
             <a:pPr lvl="1"/>
             <a:r>
-              <a:rPr lang="en-US" smtClean="0"/>
+              <a:rPr lang="en-US"/>
               <a:t>Second level</a:t>
             </a:r>
           </a:p>
           <a:p>
             <a:pPr lvl="2"/>
             <a:r>
-              <a:rPr lang="en-US" smtClean="0"/>
+              <a:rPr lang="en-US"/>
               <a:t>Third level</a:t>
             </a:r>
           </a:p>
           <a:p>
             <a:pPr lvl="3"/>
             <a:r>
-              <a:rPr lang="en-US" smtClean="0"/>
+              <a:rPr lang="en-US"/>
               <a:t>Fourth level</a:t>
             </a:r>
           </a:p>
           <a:p>
             <a:pPr lvl="4"/>
             <a:r>
-              <a:rPr lang="en-US" smtClean="0"/>
+              <a:rPr lang="en-US"/>
               <a:t>Fifth level</a:t>
             </a:r>
-            <a:endParaRPr lang="en-US"/>
           </a:p>
         </p:txBody>
       </p:sp>
@@ -772,7 +768,7 @@
           <a:p>
             <a:fld id="{04F1D4A2-813C-F741-B481-C92B3A596030}" type="datetimeFigureOut">
               <a:rPr lang="en-US" smtClean="0"/>
-              <a:t>12/26/18</a:t>
+              <a:t>1/1/2021</a:t>
             </a:fld>
             <a:endParaRPr lang="en-US"/>
           </a:p>
@@ -871,10 +867,9 @@
           <a:lstStyle/>
           <a:p>
             <a:r>
-              <a:rPr lang="en-US" smtClean="0"/>
+              <a:rPr lang="en-US"/>
               <a:t>Click to edit Master title style</a:t>
             </a:r>
-            <a:endParaRPr lang="en-US"/>
           </a:p>
         </p:txBody>
       </p:sp>
@@ -900,38 +895,37 @@
           <a:p>
             <a:pPr lvl="0"/>
             <a:r>
-              <a:rPr lang="en-US" smtClean="0"/>
+              <a:rPr lang="en-US"/>
               <a:t>Click to edit Master text styles</a:t>
             </a:r>
           </a:p>
           <a:p>
             <a:pPr lvl="1"/>
             <a:r>
-              <a:rPr lang="en-US" smtClean="0"/>
+              <a:rPr lang="en-US"/>
               <a:t>Second level</a:t>
             </a:r>
           </a:p>
           <a:p>
             <a:pPr lvl="2"/>
             <a:r>
-              <a:rPr lang="en-US" smtClean="0"/>
+              <a:rPr lang="en-US"/>
               <a:t>Third level</a:t>
             </a:r>
           </a:p>
           <a:p>
             <a:pPr lvl="3"/>
             <a:r>
-              <a:rPr lang="en-US" smtClean="0"/>
+              <a:rPr lang="en-US"/>
               <a:t>Fourth level</a:t>
             </a:r>
           </a:p>
           <a:p>
             <a:pPr lvl="4"/>
             <a:r>
-              <a:rPr lang="en-US" smtClean="0"/>
+              <a:rPr lang="en-US"/>
               <a:t>Fifth level</a:t>
             </a:r>
-            <a:endParaRPr lang="en-US"/>
           </a:p>
         </p:txBody>
       </p:sp>
@@ -952,7 +946,7 @@
           <a:p>
             <a:fld id="{04F1D4A2-813C-F741-B481-C92B3A596030}" type="datetimeFigureOut">
               <a:rPr lang="en-US" smtClean="0"/>
-              <a:t>12/26/18</a:t>
+              <a:t>1/1/2021</a:t>
             </a:fld>
             <a:endParaRPr lang="en-US"/>
           </a:p>
@@ -1050,10 +1044,9 @@
           </a:lstStyle>
           <a:p>
             <a:r>
-              <a:rPr lang="en-US" dirty="0" smtClean="0"/>
+              <a:rPr lang="en-US" dirty="0"/>
               <a:t>Click to edit Master title style</a:t>
             </a:r>
-            <a:endParaRPr lang="en-US" dirty="0"/>
           </a:p>
         </p:txBody>
       </p:sp>
@@ -1081,38 +1074,37 @@
           <a:p>
             <a:pPr lvl="0"/>
             <a:r>
-              <a:rPr lang="en-US" dirty="0" smtClean="0"/>
+              <a:rPr lang="en-US" dirty="0"/>
               <a:t>Click to edit Master text styles</a:t>
             </a:r>
           </a:p>
           <a:p>
             <a:pPr lvl="1"/>
             <a:r>
-              <a:rPr lang="en-US" dirty="0" smtClean="0"/>
+              <a:rPr lang="en-US" dirty="0"/>
               <a:t>Second level</a:t>
             </a:r>
           </a:p>
           <a:p>
             <a:pPr lvl="2"/>
             <a:r>
-              <a:rPr lang="en-US" dirty="0" smtClean="0"/>
+              <a:rPr lang="en-US" dirty="0"/>
               <a:t>Third level</a:t>
             </a:r>
           </a:p>
           <a:p>
             <a:pPr lvl="3"/>
             <a:r>
-              <a:rPr lang="en-US" dirty="0" smtClean="0"/>
+              <a:rPr lang="en-US" dirty="0"/>
               <a:t>Fourth level</a:t>
             </a:r>
           </a:p>
           <a:p>
             <a:pPr lvl="4"/>
             <a:r>
-              <a:rPr lang="en-US" dirty="0" smtClean="0"/>
+              <a:rPr lang="en-US" dirty="0"/>
               <a:t>Fifth level</a:t>
             </a:r>
-            <a:endParaRPr lang="en-US" dirty="0"/>
           </a:p>
         </p:txBody>
       </p:sp>
@@ -1133,7 +1125,7 @@
           <a:p>
             <a:fld id="{04F1D4A2-813C-F741-B481-C92B3A596030}" type="datetimeFigureOut">
               <a:rPr lang="en-US" smtClean="0"/>
-              <a:t>12/26/18</a:t>
+              <a:t>1/1/2021</a:t>
             </a:fld>
             <a:endParaRPr lang="en-US"/>
           </a:p>
@@ -1236,10 +1228,9 @@
           </a:lstStyle>
           <a:p>
             <a:r>
-              <a:rPr lang="en-US" smtClean="0"/>
+              <a:rPr lang="en-US"/>
               <a:t>Click to edit Master title style</a:t>
             </a:r>
-            <a:endParaRPr lang="en-US"/>
           </a:p>
         </p:txBody>
       </p:sp>
@@ -1356,7 +1347,7 @@
           <a:p>
             <a:pPr lvl="0"/>
             <a:r>
-              <a:rPr lang="en-US" smtClean="0"/>
+              <a:rPr lang="en-US"/>
               <a:t>Click to edit Master text styles</a:t>
             </a:r>
           </a:p>
@@ -1379,7 +1370,7 @@
           <a:p>
             <a:fld id="{04F1D4A2-813C-F741-B481-C92B3A596030}" type="datetimeFigureOut">
               <a:rPr lang="en-US" smtClean="0"/>
-              <a:t>12/26/18</a:t>
+              <a:t>1/1/2021</a:t>
             </a:fld>
             <a:endParaRPr lang="en-US"/>
           </a:p>
@@ -1473,10 +1464,9 @@
           <a:lstStyle/>
           <a:p>
             <a:r>
-              <a:rPr lang="en-US" smtClean="0"/>
+              <a:rPr lang="en-US"/>
               <a:t>Click to edit Master title style</a:t>
             </a:r>
-            <a:endParaRPr lang="en-US"/>
           </a:p>
         </p:txBody>
       </p:sp>
@@ -1502,38 +1492,37 @@
           <a:p>
             <a:pPr lvl="0"/>
             <a:r>
-              <a:rPr lang="en-US" smtClean="0"/>
+              <a:rPr lang="en-US"/>
               <a:t>Click to edit Master text styles</a:t>
             </a:r>
           </a:p>
           <a:p>
             <a:pPr lvl="1"/>
             <a:r>
-              <a:rPr lang="en-US" smtClean="0"/>
+              <a:rPr lang="en-US"/>
               <a:t>Second level</a:t>
             </a:r>
           </a:p>
           <a:p>
             <a:pPr lvl="2"/>
             <a:r>
-              <a:rPr lang="en-US" smtClean="0"/>
+              <a:rPr lang="en-US"/>
               <a:t>Third level</a:t>
             </a:r>
           </a:p>
           <a:p>
             <a:pPr lvl="3"/>
             <a:r>
-              <a:rPr lang="en-US" smtClean="0"/>
+              <a:rPr lang="en-US"/>
               <a:t>Fourth level</a:t>
             </a:r>
           </a:p>
           <a:p>
             <a:pPr lvl="4"/>
             <a:r>
-              <a:rPr lang="en-US" smtClean="0"/>
+              <a:rPr lang="en-US"/>
               <a:t>Fifth level</a:t>
             </a:r>
-            <a:endParaRPr lang="en-US"/>
           </a:p>
         </p:txBody>
       </p:sp>
@@ -1559,38 +1548,37 @@
           <a:p>
             <a:pPr lvl="0"/>
             <a:r>
-              <a:rPr lang="en-US" smtClean="0"/>
+              <a:rPr lang="en-US"/>
               <a:t>Click to edit Master text styles</a:t>
             </a:r>
           </a:p>
           <a:p>
             <a:pPr lvl="1"/>
             <a:r>
-              <a:rPr lang="en-US" smtClean="0"/>
+              <a:rPr lang="en-US"/>
               <a:t>Second level</a:t>
             </a:r>
           </a:p>
           <a:p>
             <a:pPr lvl="2"/>
             <a:r>
-              <a:rPr lang="en-US" smtClean="0"/>
+              <a:rPr lang="en-US"/>
               <a:t>Third level</a:t>
             </a:r>
           </a:p>
           <a:p>
             <a:pPr lvl="3"/>
             <a:r>
-              <a:rPr lang="en-US" smtClean="0"/>
+              <a:rPr lang="en-US"/>
               <a:t>Fourth level</a:t>
             </a:r>
           </a:p>
           <a:p>
             <a:pPr lvl="4"/>
             <a:r>
-              <a:rPr lang="en-US" smtClean="0"/>
+              <a:rPr lang="en-US"/>
               <a:t>Fifth level</a:t>
             </a:r>
-            <a:endParaRPr lang="en-US"/>
           </a:p>
         </p:txBody>
       </p:sp>
@@ -1611,7 +1599,7 @@
           <a:p>
             <a:fld id="{04F1D4A2-813C-F741-B481-C92B3A596030}" type="datetimeFigureOut">
               <a:rPr lang="en-US" smtClean="0"/>
-              <a:t>12/26/18</a:t>
+              <a:t>1/1/2021</a:t>
             </a:fld>
             <a:endParaRPr lang="en-US"/>
           </a:p>
@@ -1710,10 +1698,9 @@
           <a:lstStyle/>
           <a:p>
             <a:r>
-              <a:rPr lang="en-US" smtClean="0"/>
+              <a:rPr lang="en-US"/>
               <a:t>Click to edit Master title style</a:t>
             </a:r>
-            <a:endParaRPr lang="en-US"/>
           </a:p>
         </p:txBody>
       </p:sp>
@@ -1776,7 +1763,7 @@
           <a:p>
             <a:pPr lvl="0"/>
             <a:r>
-              <a:rPr lang="en-US" smtClean="0"/>
+              <a:rPr lang="en-US"/>
               <a:t>Click to edit Master text styles</a:t>
             </a:r>
           </a:p>
@@ -1804,38 +1791,37 @@
           <a:p>
             <a:pPr lvl="0"/>
             <a:r>
-              <a:rPr lang="en-US" smtClean="0"/>
+              <a:rPr lang="en-US"/>
               <a:t>Click to edit Master text styles</a:t>
             </a:r>
           </a:p>
           <a:p>
             <a:pPr lvl="1"/>
             <a:r>
-              <a:rPr lang="en-US" smtClean="0"/>
+              <a:rPr lang="en-US"/>
               <a:t>Second level</a:t>
             </a:r>
           </a:p>
           <a:p>
             <a:pPr lvl="2"/>
             <a:r>
-              <a:rPr lang="en-US" smtClean="0"/>
+              <a:rPr lang="en-US"/>
               <a:t>Third level</a:t>
             </a:r>
           </a:p>
           <a:p>
             <a:pPr lvl="3"/>
             <a:r>
-              <a:rPr lang="en-US" smtClean="0"/>
+              <a:rPr lang="en-US"/>
               <a:t>Fourth level</a:t>
             </a:r>
           </a:p>
           <a:p>
             <a:pPr lvl="4"/>
             <a:r>
-              <a:rPr lang="en-US" smtClean="0"/>
+              <a:rPr lang="en-US"/>
               <a:t>Fifth level</a:t>
             </a:r>
-            <a:endParaRPr lang="en-US"/>
           </a:p>
         </p:txBody>
       </p:sp>
@@ -1898,7 +1884,7 @@
           <a:p>
             <a:pPr lvl="0"/>
             <a:r>
-              <a:rPr lang="en-US" smtClean="0"/>
+              <a:rPr lang="en-US"/>
               <a:t>Click to edit Master text styles</a:t>
             </a:r>
           </a:p>
@@ -1926,38 +1912,37 @@
           <a:p>
             <a:pPr lvl="0"/>
             <a:r>
-              <a:rPr lang="en-US" smtClean="0"/>
+              <a:rPr lang="en-US"/>
               <a:t>Click to edit Master text styles</a:t>
             </a:r>
           </a:p>
           <a:p>
             <a:pPr lvl="1"/>
             <a:r>
-              <a:rPr lang="en-US" smtClean="0"/>
+              <a:rPr lang="en-US"/>
               <a:t>Second level</a:t>
             </a:r>
           </a:p>
           <a:p>
             <a:pPr lvl="2"/>
             <a:r>
-              <a:rPr lang="en-US" smtClean="0"/>
+              <a:rPr lang="en-US"/>
               <a:t>Third level</a:t>
             </a:r>
           </a:p>
           <a:p>
             <a:pPr lvl="3"/>
             <a:r>
-              <a:rPr lang="en-US" smtClean="0"/>
+              <a:rPr lang="en-US"/>
               <a:t>Fourth level</a:t>
             </a:r>
           </a:p>
           <a:p>
             <a:pPr lvl="4"/>
             <a:r>
-              <a:rPr lang="en-US" smtClean="0"/>
+              <a:rPr lang="en-US"/>
               <a:t>Fifth level</a:t>
             </a:r>
-            <a:endParaRPr lang="en-US"/>
           </a:p>
         </p:txBody>
       </p:sp>
@@ -1978,7 +1963,7 @@
           <a:p>
             <a:fld id="{04F1D4A2-813C-F741-B481-C92B3A596030}" type="datetimeFigureOut">
               <a:rPr lang="en-US" smtClean="0"/>
-              <a:t>12/26/18</a:t>
+              <a:t>1/1/2021</a:t>
             </a:fld>
             <a:endParaRPr lang="en-US"/>
           </a:p>
@@ -2072,10 +2057,9 @@
           <a:lstStyle/>
           <a:p>
             <a:r>
-              <a:rPr lang="en-US" smtClean="0"/>
+              <a:rPr lang="en-US"/>
               <a:t>Click to edit Master title style</a:t>
             </a:r>
-            <a:endParaRPr lang="en-US"/>
           </a:p>
         </p:txBody>
       </p:sp>
@@ -2096,7 +2080,7 @@
           <a:p>
             <a:fld id="{04F1D4A2-813C-F741-B481-C92B3A596030}" type="datetimeFigureOut">
               <a:rPr lang="en-US" smtClean="0"/>
-              <a:t>12/26/18</a:t>
+              <a:t>1/1/2021</a:t>
             </a:fld>
             <a:endParaRPr lang="en-US"/>
           </a:p>
@@ -2191,7 +2175,7 @@
           <a:p>
             <a:fld id="{04F1D4A2-813C-F741-B481-C92B3A596030}" type="datetimeFigureOut">
               <a:rPr lang="en-US" smtClean="0"/>
-              <a:t>12/26/18</a:t>
+              <a:t>1/1/2021</a:t>
             </a:fld>
             <a:endParaRPr lang="en-US"/>
           </a:p>
@@ -2294,10 +2278,9 @@
           </a:lstStyle>
           <a:p>
             <a:r>
-              <a:rPr lang="en-US" smtClean="0"/>
+              <a:rPr lang="en-US"/>
               <a:t>Click to edit Master title style</a:t>
             </a:r>
-            <a:endParaRPr lang="en-US"/>
           </a:p>
         </p:txBody>
       </p:sp>
@@ -2351,38 +2334,37 @@
           <a:p>
             <a:pPr lvl="0"/>
             <a:r>
-              <a:rPr lang="en-US" smtClean="0"/>
+              <a:rPr lang="en-US"/>
               <a:t>Click to edit Master text styles</a:t>
             </a:r>
           </a:p>
           <a:p>
             <a:pPr lvl="1"/>
             <a:r>
-              <a:rPr lang="en-US" smtClean="0"/>
+              <a:rPr lang="en-US"/>
               <a:t>Second level</a:t>
             </a:r>
           </a:p>
           <a:p>
             <a:pPr lvl="2"/>
             <a:r>
-              <a:rPr lang="en-US" smtClean="0"/>
+              <a:rPr lang="en-US"/>
               <a:t>Third level</a:t>
             </a:r>
           </a:p>
           <a:p>
             <a:pPr lvl="3"/>
             <a:r>
-              <a:rPr lang="en-US" smtClean="0"/>
+              <a:rPr lang="en-US"/>
               <a:t>Fourth level</a:t>
             </a:r>
           </a:p>
           <a:p>
             <a:pPr lvl="4"/>
             <a:r>
-              <a:rPr lang="en-US" smtClean="0"/>
+              <a:rPr lang="en-US"/>
               <a:t>Fifth level</a:t>
             </a:r>
-            <a:endParaRPr lang="en-US"/>
           </a:p>
         </p:txBody>
       </p:sp>
@@ -2445,7 +2427,7 @@
           <a:p>
             <a:pPr lvl="0"/>
             <a:r>
-              <a:rPr lang="en-US" smtClean="0"/>
+              <a:rPr lang="en-US"/>
               <a:t>Click to edit Master text styles</a:t>
             </a:r>
           </a:p>
@@ -2468,7 +2450,7 @@
           <a:p>
             <a:fld id="{04F1D4A2-813C-F741-B481-C92B3A596030}" type="datetimeFigureOut">
               <a:rPr lang="en-US" smtClean="0"/>
-              <a:t>12/26/18</a:t>
+              <a:t>1/1/2021</a:t>
             </a:fld>
             <a:endParaRPr lang="en-US"/>
           </a:p>
@@ -2571,10 +2553,9 @@
           </a:lstStyle>
           <a:p>
             <a:r>
-              <a:rPr lang="en-US" smtClean="0"/>
+              <a:rPr lang="en-US"/>
               <a:t>Click to edit Master title style</a:t>
             </a:r>
-            <a:endParaRPr lang="en-US"/>
           </a:p>
         </p:txBody>
       </p:sp>
@@ -2698,7 +2679,7 @@
           <a:p>
             <a:pPr lvl="0"/>
             <a:r>
-              <a:rPr lang="en-US" smtClean="0"/>
+              <a:rPr lang="en-US"/>
               <a:t>Click to edit Master text styles</a:t>
             </a:r>
           </a:p>
@@ -2721,7 +2702,7 @@
           <a:p>
             <a:fld id="{04F1D4A2-813C-F741-B481-C92B3A596030}" type="datetimeFigureOut">
               <a:rPr lang="en-US" smtClean="0"/>
-              <a:t>12/26/18</a:t>
+              <a:t>1/1/2021</a:t>
             </a:fld>
             <a:endParaRPr lang="en-US"/>
           </a:p>
@@ -2830,10 +2811,9 @@
           <a:lstStyle/>
           <a:p>
             <a:r>
-              <a:rPr lang="en-US" dirty="0" smtClean="0"/>
+              <a:rPr lang="en-US" dirty="0"/>
               <a:t>Click to edit Master title style</a:t>
             </a:r>
-            <a:endParaRPr lang="en-US" dirty="0"/>
           </a:p>
         </p:txBody>
       </p:sp>
@@ -2864,38 +2844,37 @@
           <a:p>
             <a:pPr lvl="0"/>
             <a:r>
-              <a:rPr lang="en-US" smtClean="0"/>
+              <a:rPr lang="en-US"/>
               <a:t>Click to edit Master text styles</a:t>
             </a:r>
           </a:p>
           <a:p>
             <a:pPr lvl="1"/>
             <a:r>
-              <a:rPr lang="en-US" smtClean="0"/>
+              <a:rPr lang="en-US"/>
               <a:t>Second level</a:t>
             </a:r>
           </a:p>
           <a:p>
             <a:pPr lvl="2"/>
             <a:r>
-              <a:rPr lang="en-US" smtClean="0"/>
+              <a:rPr lang="en-US"/>
               <a:t>Third level</a:t>
             </a:r>
           </a:p>
           <a:p>
             <a:pPr lvl="3"/>
             <a:r>
-              <a:rPr lang="en-US" smtClean="0"/>
+              <a:rPr lang="en-US"/>
               <a:t>Fourth level</a:t>
             </a:r>
           </a:p>
           <a:p>
             <a:pPr lvl="4"/>
             <a:r>
-              <a:rPr lang="en-US" smtClean="0"/>
+              <a:rPr lang="en-US"/>
               <a:t>Fifth level</a:t>
             </a:r>
-            <a:endParaRPr lang="en-US"/>
           </a:p>
         </p:txBody>
       </p:sp>
@@ -2934,7 +2913,7 @@
           <a:p>
             <a:fld id="{04F1D4A2-813C-F741-B481-C92B3A596030}" type="datetimeFigureOut">
               <a:rPr lang="en-US" smtClean="0"/>
-              <a:t>12/26/18</a:t>
+              <a:t>1/1/2021</a:t>
             </a:fld>
             <a:endParaRPr lang="en-US"/>
           </a:p>
@@ -3363,32 +3342,27 @@
           <a:p>
             <a:pPr algn="l"/>
             <a:r>
-              <a:rPr lang="en-US" dirty="0" smtClean="0"/>
+              <a:rPr lang="en-US" dirty="0"/>
               <a:t>Enterprise </a:t>
             </a:r>
             <a:r>
-              <a:rPr lang="en-US" dirty="0" err="1" smtClean="0"/>
+              <a:rPr lang="en-US" dirty="0" err="1"/>
               <a:t>Programmering</a:t>
             </a:r>
             <a:r>
-              <a:rPr lang="en-US" dirty="0" smtClean="0"/>
+              <a:rPr lang="en-US" dirty="0"/>
               <a:t> 1</a:t>
             </a:r>
             <a:br>
-              <a:rPr lang="en-US" dirty="0" smtClean="0"/>
+              <a:rPr lang="en-US" dirty="0"/>
             </a:br>
-            <a:r>
-              <a:rPr lang="en-US" dirty="0" smtClean="0"/>
-              <a:t/>
-            </a:r>
             <a:br>
-              <a:rPr lang="en-US" dirty="0" smtClean="0"/>
+              <a:rPr lang="en-US" dirty="0"/>
             </a:br>
             <a:r>
-              <a:rPr lang="en-US" dirty="0" smtClean="0"/>
+              <a:rPr lang="en-US" dirty="0"/>
               <a:t>Lesson 06: EJB</a:t>
             </a:r>
-            <a:endParaRPr lang="en-US" dirty="0"/>
           </a:p>
         </p:txBody>
       </p:sp>
@@ -3416,15 +3390,11 @@
           <a:p>
             <a:pPr algn="r"/>
             <a:r>
-              <a:rPr lang="en-US" smtClean="0"/>
-              <a:t>Prof</a:t>
-            </a:r>
-            <a:r>
-              <a:rPr lang="en-US" smtClean="0"/>
-              <a:t>. </a:t>
-            </a:r>
-            <a:r>
-              <a:rPr lang="en-US" dirty="0" smtClean="0"/>
+              <a:rPr lang="en-US"/>
+              <a:t>Prof. </a:t>
+            </a:r>
+            <a:r>
+              <a:rPr lang="en-US" dirty="0"/>
               <a:t>Andrea Arcuri</a:t>
             </a:r>
           </a:p>
@@ -3476,10 +3446,9 @@
           <a:lstStyle/>
           <a:p>
             <a:r>
-              <a:rPr lang="en-US" dirty="0" smtClean="0"/>
+              <a:rPr lang="en-US" dirty="0"/>
               <a:t>About these slides</a:t>
             </a:r>
-            <a:endParaRPr lang="en-US" dirty="0"/>
           </a:p>
         </p:txBody>
       </p:sp>
@@ -3499,28 +3468,23 @@
           <a:lstStyle/>
           <a:p>
             <a:r>
-              <a:rPr lang="en-US" dirty="0" smtClean="0"/>
+              <a:rPr lang="en-US" dirty="0"/>
               <a:t>These slides are just high level overviews of the topics covered in class</a:t>
             </a:r>
           </a:p>
           <a:p>
             <a:r>
               <a:rPr lang="en-US" dirty="0"/>
-              <a:t>T</a:t>
-            </a:r>
-            <a:r>
-              <a:rPr lang="en-US" dirty="0" smtClean="0"/>
-              <a:t>he details are directly in the code comments on the </a:t>
-            </a:r>
-            <a:r>
-              <a:rPr lang="en-US" dirty="0" err="1" smtClean="0"/>
+              <a:t>The details are directly in the code comments on the </a:t>
+            </a:r>
+            <a:r>
+              <a:rPr lang="en-US" dirty="0" err="1"/>
               <a:t>Git</a:t>
             </a:r>
             <a:r>
-              <a:rPr lang="en-US" dirty="0" smtClean="0"/>
+              <a:rPr lang="en-US" dirty="0"/>
               <a:t> repository</a:t>
             </a:r>
-            <a:endParaRPr lang="en-US" dirty="0"/>
           </a:p>
         </p:txBody>
       </p:sp>
@@ -3570,10 +3534,9 @@
           <a:lstStyle/>
           <a:p>
             <a:r>
-              <a:rPr lang="en-US" dirty="0" smtClean="0"/>
+              <a:rPr lang="en-US" dirty="0"/>
               <a:t>Proxy Class Enhancements</a:t>
             </a:r>
-            <a:endParaRPr lang="en-US" dirty="0"/>
           </a:p>
         </p:txBody>
       </p:sp>
@@ -3593,40 +3556,39 @@
           <a:lstStyle/>
           <a:p>
             <a:r>
-              <a:rPr lang="en-US" dirty="0" smtClean="0"/>
+              <a:rPr lang="en-US" dirty="0"/>
               <a:t>You focus on business logic when writing EJBs</a:t>
             </a:r>
           </a:p>
           <a:p>
             <a:r>
-              <a:rPr lang="en-US" dirty="0" smtClean="0"/>
+              <a:rPr lang="en-US" dirty="0"/>
               <a:t>JEE Container will automatically add functionalities</a:t>
             </a:r>
           </a:p>
           <a:p>
             <a:r>
-              <a:rPr lang="en-US" dirty="0" err="1" smtClean="0"/>
+              <a:rPr lang="en-US" dirty="0" err="1"/>
               <a:t>Eg</a:t>
             </a:r>
             <a:r>
-              <a:rPr lang="en-US" dirty="0" smtClean="0"/>
+              <a:rPr lang="en-US" dirty="0"/>
               <a:t>, starting/committing transaction for each method invocation</a:t>
             </a:r>
           </a:p>
           <a:p>
             <a:r>
-              <a:rPr lang="en-US" dirty="0" smtClean="0"/>
+              <a:rPr lang="en-US" dirty="0"/>
               <a:t>But also other functionalities are available, and can be activated via </a:t>
             </a:r>
             <a:r>
-              <a:rPr lang="en-US" b="1" dirty="0" smtClean="0"/>
+              <a:rPr lang="en-US" b="1" dirty="0"/>
               <a:t>@</a:t>
             </a:r>
             <a:r>
-              <a:rPr lang="en-US" dirty="0" smtClean="0"/>
+              <a:rPr lang="en-US" dirty="0"/>
               <a:t> annotations</a:t>
             </a:r>
-            <a:endParaRPr lang="en-US" dirty="0"/>
           </a:p>
         </p:txBody>
       </p:sp>
@@ -3710,37 +3672,32 @@
             </a:r>
             <a:r>
               <a:rPr lang="en-US" i="1" dirty="0"/>
-              <a:t>@</a:t>
-            </a:r>
-            <a:r>
-              <a:rPr lang="en-US" i="1" dirty="0" smtClean="0"/>
-              <a:t>Asynchronous </a:t>
-            </a:r>
-            <a:r>
-              <a:rPr lang="en-US" dirty="0" smtClean="0"/>
+              <a:t>@Asynchronous </a:t>
+            </a:r>
+            <a:r>
+              <a:rPr lang="en-US" dirty="0"/>
               <a:t>will be executed on the background in a different thread, and caller returns immediately (not going to wait for method to end)</a:t>
             </a:r>
           </a:p>
           <a:p>
             <a:r>
-              <a:rPr lang="en-US" dirty="0" smtClean="0"/>
+              <a:rPr lang="en-US" dirty="0"/>
               <a:t>Useful for long operations, and when caller does not need to get the result (important thing is the side-effect)</a:t>
             </a:r>
           </a:p>
           <a:p>
             <a:r>
-              <a:rPr lang="en-US" dirty="0" smtClean="0"/>
+              <a:rPr lang="en-US" dirty="0"/>
               <a:t>You do not need to create threads (which is expensive), or manually manage a pool of them</a:t>
             </a:r>
             <a:r>
-              <a:rPr lang="mr-IN" dirty="0" smtClean="0"/>
+              <a:rPr lang="mr-IN" dirty="0"/>
               <a:t>…</a:t>
             </a:r>
             <a:r>
-              <a:rPr lang="en-US" dirty="0" smtClean="0"/>
+              <a:rPr lang="en-US" dirty="0"/>
               <a:t> the JEE Container will do it for you automatically by using this annotation </a:t>
             </a:r>
-            <a:endParaRPr lang="en-US" dirty="0"/>
           </a:p>
         </p:txBody>
       </p:sp>
@@ -3817,7 +3774,7 @@
           <a:lstStyle/>
           <a:p>
             <a:r>
-              <a:rPr lang="en-US" dirty="0" smtClean="0"/>
+              <a:rPr lang="en-US" dirty="0"/>
               <a:t>Let’s say you need to do an action one or more times at a certain interval of time</a:t>
             </a:r>
           </a:p>
@@ -3825,49 +3782,44 @@
             <a:pPr lvl="1"/>
             <a:r>
               <a:rPr lang="en-US" dirty="0" err="1"/>
-              <a:t>e</a:t>
-            </a:r>
-            <a:r>
-              <a:rPr lang="en-US" dirty="0" err="1" smtClean="0"/>
-              <a:t>g</a:t>
-            </a:r>
-            <a:r>
-              <a:rPr lang="en-US" dirty="0" smtClean="0"/>
+              <a:t>eg</a:t>
+            </a:r>
+            <a:r>
+              <a:rPr lang="en-US" dirty="0"/>
               <a:t>, check an external resource for updated every 30 seconds</a:t>
             </a:r>
           </a:p>
           <a:p>
             <a:pPr lvl="1"/>
             <a:r>
-              <a:rPr lang="en-US" dirty="0" err="1" smtClean="0"/>
+              <a:rPr lang="en-US" dirty="0" err="1"/>
               <a:t>eg</a:t>
             </a:r>
             <a:r>
-              <a:rPr lang="en-US" dirty="0" smtClean="0"/>
+              <a:rPr lang="en-US" dirty="0"/>
               <a:t>., send special offers to customers on his/her birthday</a:t>
             </a:r>
           </a:p>
           <a:p>
             <a:r>
-              <a:rPr lang="en-US" dirty="0" smtClean="0"/>
+              <a:rPr lang="en-US" dirty="0"/>
               <a:t>You can implement your own threads and scheduler</a:t>
             </a:r>
             <a:r>
-              <a:rPr lang="mr-IN" dirty="0" smtClean="0"/>
+              <a:rPr lang="mr-IN" dirty="0"/>
               <a:t>…</a:t>
             </a:r>
             <a:r>
-              <a:rPr lang="en-US" dirty="0" smtClean="0"/>
+              <a:rPr lang="en-US" dirty="0"/>
               <a:t> or you can just annotate a EJB method with @Schedule</a:t>
             </a:r>
           </a:p>
           <a:p>
             <a:pPr lvl="1"/>
             <a:r>
-              <a:rPr lang="en-US" dirty="0" smtClean="0"/>
+              <a:rPr lang="en-US" dirty="0"/>
               <a:t>Fine grained settings to specify seconds/minutes/hours/etc.</a:t>
             </a:r>
-            <a:endParaRPr lang="en-US" dirty="0"/>
           </a:p>
         </p:txBody>
       </p:sp>
@@ -3917,10 +3869,9 @@
           <a:lstStyle/>
           <a:p>
             <a:r>
-              <a:rPr lang="en-US" dirty="0" smtClean="0"/>
+              <a:rPr lang="en-US" dirty="0"/>
               <a:t>Transactions</a:t>
             </a:r>
-            <a:endParaRPr lang="en-US" dirty="0"/>
           </a:p>
         </p:txBody>
       </p:sp>
@@ -3947,110 +3898,109 @@
           <a:lstStyle/>
           <a:p>
             <a:r>
-              <a:rPr lang="en-US" dirty="0" smtClean="0"/>
+              <a:rPr lang="en-US" dirty="0"/>
               <a:t>EJB methods are executed in a transaction</a:t>
             </a:r>
             <a:r>
-              <a:rPr lang="mr-IN" dirty="0" smtClean="0"/>
+              <a:rPr lang="mr-IN" dirty="0"/>
               <a:t>…</a:t>
             </a:r>
-            <a:endParaRPr lang="en-US" dirty="0" smtClean="0"/>
-          </a:p>
-          <a:p>
-            <a:r>
-              <a:rPr lang="en-US" dirty="0" smtClean="0"/>
+            <a:endParaRPr lang="en-US" dirty="0"/>
+          </a:p>
+          <a:p>
+            <a:r>
+              <a:rPr lang="en-US" dirty="0"/>
               <a:t>But what if EJB call a method in another EJB? </a:t>
             </a:r>
           </a:p>
           <a:p>
             <a:pPr lvl="1"/>
             <a:r>
-              <a:rPr lang="en-US" dirty="0" smtClean="0"/>
+              <a:rPr lang="en-US" dirty="0"/>
               <a:t>Would it be in a new transaction? </a:t>
             </a:r>
           </a:p>
           <a:p>
             <a:pPr lvl="1"/>
             <a:r>
-              <a:rPr lang="en-US" dirty="0" smtClean="0"/>
+              <a:rPr lang="en-US" dirty="0"/>
               <a:t>Are the transaction joined in a single one?</a:t>
             </a:r>
           </a:p>
           <a:p>
             <a:r>
-              <a:rPr lang="en-US" dirty="0" smtClean="0"/>
+              <a:rPr lang="en-US" dirty="0"/>
               <a:t>What if EJB method calls another method in the same EJB?</a:t>
             </a:r>
           </a:p>
           <a:p>
             <a:pPr lvl="1"/>
             <a:r>
-              <a:rPr lang="en-US" dirty="0" smtClean="0"/>
+              <a:rPr lang="en-US" dirty="0"/>
               <a:t>This one is actually quite tricky</a:t>
             </a:r>
             <a:r>
-              <a:rPr lang="mr-IN" dirty="0" smtClean="0"/>
+              <a:rPr lang="mr-IN" dirty="0"/>
               <a:t>…</a:t>
             </a:r>
-            <a:endParaRPr lang="en-US" dirty="0" smtClean="0"/>
-          </a:p>
-          <a:p>
-            <a:r>
-              <a:rPr lang="en-US" dirty="0" smtClean="0"/>
+            <a:endParaRPr lang="en-US" dirty="0"/>
+          </a:p>
+          <a:p>
+            <a:r>
+              <a:rPr lang="en-US" dirty="0"/>
               <a:t>What if an exception is thrown during a EJB method call?</a:t>
             </a:r>
           </a:p>
           <a:p>
             <a:pPr lvl="1"/>
             <a:r>
-              <a:rPr lang="en-US" dirty="0" smtClean="0"/>
+              <a:rPr lang="en-US" dirty="0"/>
               <a:t>Are the changes so far on the </a:t>
             </a:r>
             <a:r>
-              <a:rPr lang="en-US" dirty="0" err="1" smtClean="0"/>
+              <a:rPr lang="en-US" dirty="0" err="1"/>
               <a:t>EntityManager</a:t>
             </a:r>
             <a:r>
-              <a:rPr lang="en-US" dirty="0" smtClean="0"/>
+              <a:rPr lang="en-US" dirty="0"/>
               <a:t> cache committed? </a:t>
             </a:r>
           </a:p>
           <a:p>
             <a:pPr lvl="1"/>
             <a:r>
-              <a:rPr lang="en-US" dirty="0" smtClean="0"/>
+              <a:rPr lang="en-US" dirty="0"/>
               <a:t>Or everything is </a:t>
             </a:r>
             <a:r>
-              <a:rPr lang="en-US" dirty="0" err="1" smtClean="0"/>
+              <a:rPr lang="en-US" dirty="0" err="1"/>
               <a:t>rolledback</a:t>
             </a:r>
             <a:r>
-              <a:rPr lang="en-US" dirty="0" smtClean="0"/>
+              <a:rPr lang="en-US" dirty="0"/>
               <a:t>?</a:t>
             </a:r>
           </a:p>
           <a:p>
             <a:r>
-              <a:rPr lang="en-US" dirty="0" smtClean="0"/>
+              <a:rPr lang="en-US" dirty="0"/>
               <a:t>All these cases can be set with annotations</a:t>
             </a:r>
             <a:r>
-              <a:rPr lang="mr-IN" dirty="0" smtClean="0"/>
+              <a:rPr lang="mr-IN" dirty="0"/>
               <a:t>…</a:t>
             </a:r>
-            <a:endParaRPr lang="en-US" dirty="0" smtClean="0"/>
-          </a:p>
-          <a:p>
-            <a:r>
-              <a:rPr lang="mr-IN" dirty="0" smtClean="0"/>
+            <a:endParaRPr lang="en-US" dirty="0"/>
+          </a:p>
+          <a:p>
+            <a:r>
+              <a:rPr lang="mr-IN" dirty="0"/>
               <a:t>…</a:t>
             </a:r>
             <a:r>
-              <a:rPr lang="en-US" dirty="0" smtClean="0"/>
+              <a:rPr lang="en-US" dirty="0"/>
               <a:t> default settings are going to be fine most of the time, but need to have a clear understanding of when transactions start/end</a:t>
             </a:r>
-            <a:endParaRPr lang="en-US" dirty="0"/>
           </a:p>
         </p:txBody>
       </p:sp>
@@ -4086,6 +4036,169 @@
       </p:grpSpPr>
       <p:sp>
         <p:nvSpPr>
+          <p:cNvPr id="2" name="Title 1">
+            <a:extLst>
+              <a:ext uri="{FF2B5EF4-FFF2-40B4-BE49-F238E27FC236}">
+                <a16:creationId xmlns:a16="http://schemas.microsoft.com/office/drawing/2014/main" id="{4E503450-5C40-4080-AE26-4169B3E4F0D5}"/>
+              </a:ext>
+            </a:extLst>
+          </p:cNvPr>
+          <p:cNvSpPr>
+            <a:spLocks noGrp="1"/>
+          </p:cNvSpPr>
+          <p:nvPr>
+            <p:ph type="title"/>
+          </p:nvPr>
+        </p:nvSpPr>
+        <p:spPr/>
+        <p:txBody>
+          <a:bodyPr/>
+          <a:lstStyle/>
+          <a:p>
+            <a:r>
+              <a:rPr lang="en-US" dirty="0"/>
+              <a:t>Transaction Handling</a:t>
+            </a:r>
+          </a:p>
+        </p:txBody>
+      </p:sp>
+      <p:sp>
+        <p:nvSpPr>
+          <p:cNvPr id="3" name="Content Placeholder 2">
+            <a:extLst>
+              <a:ext uri="{FF2B5EF4-FFF2-40B4-BE49-F238E27FC236}">
+                <a16:creationId xmlns:a16="http://schemas.microsoft.com/office/drawing/2014/main" id="{AA31C6AA-9436-4C12-876F-083D85913F47}"/>
+              </a:ext>
+            </a:extLst>
+          </p:cNvPr>
+          <p:cNvSpPr>
+            <a:spLocks noGrp="1"/>
+          </p:cNvSpPr>
+          <p:nvPr>
+            <p:ph idx="1"/>
+          </p:nvPr>
+        </p:nvSpPr>
+        <p:spPr>
+          <a:xfrm>
+            <a:off x="210553" y="1825624"/>
+            <a:ext cx="11796963" cy="4906043"/>
+          </a:xfrm>
+        </p:spPr>
+        <p:txBody>
+          <a:bodyPr/>
+          <a:lstStyle/>
+          <a:p>
+            <a:r>
+              <a:rPr lang="en-US" dirty="0"/>
+              <a:t>EJB public methods will handle transactions by default</a:t>
+            </a:r>
+          </a:p>
+          <a:p>
+            <a:r>
+              <a:rPr lang="en-US" dirty="0"/>
+              <a:t>Can use @annotations to fine tune them</a:t>
+            </a:r>
+          </a:p>
+          <a:p>
+            <a:pPr lvl="1"/>
+            <a:r>
+              <a:rPr lang="en-US" i="1" dirty="0"/>
+              <a:t>REQUIRED</a:t>
+            </a:r>
+            <a:r>
+              <a:rPr lang="en-US" dirty="0"/>
+              <a:t>: default setting, start new transaction if none is active, or join current active one</a:t>
+            </a:r>
+          </a:p>
+          <a:p>
+            <a:pPr lvl="1"/>
+            <a:r>
+              <a:rPr lang="en-US" i="1" dirty="0"/>
+              <a:t>SUPPORTS</a:t>
+            </a:r>
+            <a:r>
+              <a:rPr lang="en-US" dirty="0"/>
+              <a:t>: if there is an ongoing transaction, join it</a:t>
+            </a:r>
+          </a:p>
+          <a:p>
+            <a:pPr lvl="1"/>
+            <a:r>
+              <a:rPr lang="en-US" i="1" dirty="0"/>
+              <a:t>REQUIRES_NEW</a:t>
+            </a:r>
+            <a:r>
+              <a:rPr lang="en-US" dirty="0"/>
+              <a:t>: always start a new transaction. If any ongoing, suspend them first</a:t>
+            </a:r>
+          </a:p>
+          <a:p>
+            <a:pPr lvl="1"/>
+            <a:r>
+              <a:rPr lang="en-US" i="1" dirty="0"/>
+              <a:t>MANDATORY</a:t>
+            </a:r>
+            <a:r>
+              <a:rPr lang="en-US" dirty="0"/>
+              <a:t>: must be run in an ongoing transaction, otherwise fail</a:t>
+            </a:r>
+          </a:p>
+          <a:p>
+            <a:pPr lvl="1"/>
+            <a:r>
+              <a:rPr lang="en-US" i="1" dirty="0"/>
+              <a:t>NOT_SUPPORTED</a:t>
+            </a:r>
+            <a:r>
+              <a:rPr lang="en-US" dirty="0"/>
+              <a:t>: put any ongoing transaction on hold</a:t>
+            </a:r>
+          </a:p>
+          <a:p>
+            <a:pPr lvl="1"/>
+            <a:r>
+              <a:rPr lang="en-US" i="1" dirty="0"/>
+              <a:t>NEVER</a:t>
+            </a:r>
+            <a:r>
+              <a:rPr lang="en-US" dirty="0"/>
+              <a:t>: throw exception if in a transaction</a:t>
+            </a:r>
+          </a:p>
+        </p:txBody>
+      </p:sp>
+    </p:spTree>
+    <p:extLst>
+      <p:ext uri="{BB962C8B-B14F-4D97-AF65-F5344CB8AC3E}">
+        <p14:creationId xmlns:p14="http://schemas.microsoft.com/office/powerpoint/2010/main" val="949442547"/>
+      </p:ext>
+    </p:extLst>
+  </p:cSld>
+  <p:clrMapOvr>
+    <a:masterClrMapping/>
+  </p:clrMapOvr>
+</p:sld>
+</file>
+
+<file path=ppt/slides/slide8.xml><?xml version="1.0" encoding="utf-8"?>
+<p:sld xmlns:a="http://schemas.openxmlformats.org/drawingml/2006/main" xmlns:r="http://schemas.openxmlformats.org/officeDocument/2006/relationships" xmlns:p="http://schemas.openxmlformats.org/presentationml/2006/main">
+  <p:cSld>
+    <p:spTree>
+      <p:nvGrpSpPr>
+        <p:cNvPr id="1" name=""/>
+        <p:cNvGrpSpPr/>
+        <p:nvPr/>
+      </p:nvGrpSpPr>
+      <p:grpSpPr>
+        <a:xfrm>
+          <a:off x="0" y="0"/>
+          <a:ext cx="0" cy="0"/>
+          <a:chOff x="0" y="0"/>
+          <a:chExt cx="0" cy="0"/>
+        </a:xfrm>
+      </p:grpSpPr>
+      <p:sp>
+        <p:nvSpPr>
           <p:cNvPr id="4" name="Title 3"/>
           <p:cNvSpPr>
             <a:spLocks noGrp="1"/>
@@ -4100,14 +4213,13 @@
           <a:lstStyle/>
           <a:p>
             <a:r>
-              <a:rPr lang="en-US" dirty="0" err="1" smtClean="0"/>
+              <a:rPr lang="en-US" dirty="0" err="1"/>
               <a:t>Git</a:t>
             </a:r>
             <a:r>
-              <a:rPr lang="en-US" dirty="0" smtClean="0"/>
+              <a:rPr lang="en-US" dirty="0"/>
               <a:t> Repository Modules</a:t>
             </a:r>
-            <a:endParaRPr lang="en-US" dirty="0"/>
           </a:p>
         </p:txBody>
       </p:sp>
@@ -4134,89 +4246,87 @@
           <a:lstStyle/>
           <a:p>
             <a:r>
-              <a:rPr lang="en-US" i="1" dirty="0" smtClean="0"/>
+              <a:rPr lang="en-US" i="1" dirty="0"/>
               <a:t>NOTE: most of the explanations will be directly in the code as comments, and not here in the slides</a:t>
             </a:r>
           </a:p>
           <a:p>
             <a:r>
-              <a:rPr lang="en-US" b="1" dirty="0" smtClean="0"/>
+              <a:rPr lang="en-US" b="1" dirty="0"/>
               <a:t>intro/</a:t>
             </a:r>
             <a:r>
-              <a:rPr lang="en-US" b="1" dirty="0" err="1" smtClean="0"/>
+              <a:rPr lang="en-US" b="1" dirty="0" err="1"/>
               <a:t>jee</a:t>
             </a:r>
             <a:r>
-              <a:rPr lang="en-US" b="1" dirty="0" smtClean="0"/>
+              <a:rPr lang="en-US" b="1" dirty="0"/>
               <a:t>/</a:t>
             </a:r>
             <a:r>
-              <a:rPr lang="en-US" b="1" dirty="0" err="1" smtClean="0"/>
+              <a:rPr lang="en-US" b="1" dirty="0" err="1"/>
               <a:t>ejb</a:t>
             </a:r>
             <a:r>
-              <a:rPr lang="en-US" b="1" dirty="0" smtClean="0"/>
+              <a:rPr lang="en-US" b="1" dirty="0"/>
               <a:t>/</a:t>
             </a:r>
             <a:r>
-              <a:rPr lang="en-US" b="1" dirty="0" err="1" smtClean="0"/>
+              <a:rPr lang="en-US" b="1" dirty="0" err="1"/>
               <a:t>async</a:t>
             </a:r>
-            <a:endParaRPr lang="en-US" b="1" dirty="0" smtClean="0"/>
-          </a:p>
-          <a:p>
-            <a:r>
-              <a:rPr lang="en-US" b="1" dirty="0" smtClean="0"/>
+            <a:endParaRPr lang="en-US" b="1" dirty="0"/>
+          </a:p>
+          <a:p>
+            <a:r>
+              <a:rPr lang="en-US" b="1" dirty="0"/>
               <a:t>intro/</a:t>
             </a:r>
             <a:r>
-              <a:rPr lang="en-US" b="1" dirty="0" err="1" smtClean="0"/>
+              <a:rPr lang="en-US" b="1" dirty="0" err="1"/>
               <a:t>jee</a:t>
             </a:r>
             <a:r>
-              <a:rPr lang="en-US" b="1" dirty="0" smtClean="0"/>
+              <a:rPr lang="en-US" b="1" dirty="0"/>
               <a:t>/</a:t>
             </a:r>
             <a:r>
-              <a:rPr lang="en-US" b="1" dirty="0" err="1" smtClean="0"/>
+              <a:rPr lang="en-US" b="1" dirty="0" err="1"/>
               <a:t>ejb</a:t>
             </a:r>
             <a:r>
-              <a:rPr lang="en-US" b="1" dirty="0" smtClean="0"/>
+              <a:rPr lang="en-US" b="1" dirty="0"/>
               <a:t>/time</a:t>
             </a:r>
-            <a:endParaRPr lang="en-US" b="1" dirty="0"/>
-          </a:p>
-          <a:p>
-            <a:r>
-              <a:rPr lang="en-US" b="1" dirty="0" smtClean="0"/>
+          </a:p>
+          <a:p>
+            <a:r>
+              <a:rPr lang="en-US" b="1" dirty="0"/>
               <a:t>intro/</a:t>
             </a:r>
             <a:r>
-              <a:rPr lang="en-US" b="1" dirty="0" err="1" smtClean="0"/>
+              <a:rPr lang="en-US" b="1" dirty="0" err="1"/>
               <a:t>jee</a:t>
             </a:r>
             <a:r>
-              <a:rPr lang="en-US" b="1" dirty="0" smtClean="0"/>
+              <a:rPr lang="en-US" b="1" dirty="0"/>
               <a:t>/</a:t>
             </a:r>
             <a:r>
-              <a:rPr lang="en-US" b="1" dirty="0" err="1" smtClean="0"/>
+              <a:rPr lang="en-US" b="1" dirty="0" err="1"/>
               <a:t>ejb</a:t>
             </a:r>
             <a:r>
-              <a:rPr lang="en-US" b="1" dirty="0" smtClean="0"/>
+              <a:rPr lang="en-US" b="1" dirty="0"/>
               <a:t>/transactions</a:t>
             </a:r>
-            <a:endParaRPr lang="en-US" dirty="0" smtClean="0"/>
-          </a:p>
-          <a:p>
-            <a:r>
-              <a:rPr lang="en-US" dirty="0" smtClean="0"/>
+            <a:endParaRPr lang="en-US" dirty="0"/>
+          </a:p>
+          <a:p>
+            <a:r>
+              <a:rPr lang="en-US" dirty="0"/>
               <a:t>Exercises for Lesson 06 (see documentation)</a:t>
             </a:r>
-            <a:endParaRPr lang="en-US" dirty="0"/>
           </a:p>
         </p:txBody>
       </p:sp>

</xml_diff>